<commit_message>
Update presentation and add lecture notes
Signed-off-by: Severin Kaderli <severin.kaderli@gmail.com>
</commit_message>
<xml_diff>
--- a/Presentation/Social_Media.pptx
+++ b/Presentation/Social_Media.pptx
@@ -226,7 +226,7 @@
           <a:p>
             <a:fld id="{50936EB8-FE1B-40AF-807A-11F28126D835}" type="datetimeFigureOut">
               <a:rPr lang="de-CH" smtClean="0"/>
-              <a:t>07.12.2017</a:t>
+              <a:t>08.12.2017</a:t>
             </a:fld>
             <a:endParaRPr lang="de-CH"/>
           </a:p>
@@ -494,6 +494,1157 @@
 </p:notesMaster>
 </file>
 
+<file path=ppt/notesSlides/notesSlide1.xml><?xml version="1.0" encoding="utf-8"?>
+<p:notes xmlns:a="http://schemas.openxmlformats.org/drawingml/2006/main" xmlns:r="http://schemas.openxmlformats.org/officeDocument/2006/relationships" xmlns:p="http://schemas.openxmlformats.org/presentationml/2006/main">
+  <p:cSld>
+    <p:spTree>
+      <p:nvGrpSpPr>
+        <p:cNvPr id="1" name=""/>
+        <p:cNvGrpSpPr/>
+        <p:nvPr/>
+      </p:nvGrpSpPr>
+      <p:grpSpPr>
+        <a:xfrm>
+          <a:off x="0" y="0"/>
+          <a:ext cx="0" cy="0"/>
+          <a:chOff x="0" y="0"/>
+          <a:chExt cx="0" cy="0"/>
+        </a:xfrm>
+      </p:grpSpPr>
+      <p:sp>
+        <p:nvSpPr>
+          <p:cNvPr id="2" name="Folienbildplatzhalter 1"/>
+          <p:cNvSpPr>
+            <a:spLocks noGrp="1" noRot="1" noChangeAspect="1"/>
+          </p:cNvSpPr>
+          <p:nvPr>
+            <p:ph type="sldImg"/>
+          </p:nvPr>
+        </p:nvSpPr>
+        <p:spPr/>
+      </p:sp>
+      <p:sp>
+        <p:nvSpPr>
+          <p:cNvPr id="3" name="Notizenplatzhalter 2"/>
+          <p:cNvSpPr>
+            <a:spLocks noGrp="1"/>
+          </p:cNvSpPr>
+          <p:nvPr>
+            <p:ph type="body" idx="1"/>
+          </p:nvPr>
+        </p:nvSpPr>
+        <p:spPr/>
+        <p:txBody>
+          <a:bodyPr/>
+          <a:lstStyle/>
+          <a:p>
+            <a:r>
+              <a:rPr lang="de-CH" dirty="0"/>
+              <a:t>Welcome</a:t>
+            </a:r>
+          </a:p>
+        </p:txBody>
+      </p:sp>
+      <p:sp>
+        <p:nvSpPr>
+          <p:cNvPr id="4" name="Foliennummernplatzhalter 3"/>
+          <p:cNvSpPr>
+            <a:spLocks noGrp="1"/>
+          </p:cNvSpPr>
+          <p:nvPr>
+            <p:ph type="sldNum" sz="quarter" idx="10"/>
+          </p:nvPr>
+        </p:nvSpPr>
+        <p:spPr/>
+        <p:txBody>
+          <a:bodyPr/>
+          <a:lstStyle/>
+          <a:p>
+            <a:fld id="{980D48BC-0EE9-4623-AA92-B80D74927229}" type="slidenum">
+              <a:rPr lang="de-CH" smtClean="0"/>
+              <a:t>1</a:t>
+            </a:fld>
+            <a:endParaRPr lang="de-CH"/>
+          </a:p>
+        </p:txBody>
+      </p:sp>
+    </p:spTree>
+    <p:extLst>
+      <p:ext uri="{BB962C8B-B14F-4D97-AF65-F5344CB8AC3E}">
+        <p14:creationId xmlns:p14="http://schemas.microsoft.com/office/powerpoint/2010/main" val="2436020845"/>
+      </p:ext>
+    </p:extLst>
+  </p:cSld>
+  <p:clrMapOvr>
+    <a:masterClrMapping/>
+  </p:clrMapOvr>
+</p:notes>
+</file>
+
+<file path=ppt/notesSlides/notesSlide2.xml><?xml version="1.0" encoding="utf-8"?>
+<p:notes xmlns:a="http://schemas.openxmlformats.org/drawingml/2006/main" xmlns:r="http://schemas.openxmlformats.org/officeDocument/2006/relationships" xmlns:p="http://schemas.openxmlformats.org/presentationml/2006/main">
+  <p:cSld>
+    <p:spTree>
+      <p:nvGrpSpPr>
+        <p:cNvPr id="1" name=""/>
+        <p:cNvGrpSpPr/>
+        <p:nvPr/>
+      </p:nvGrpSpPr>
+      <p:grpSpPr>
+        <a:xfrm>
+          <a:off x="0" y="0"/>
+          <a:ext cx="0" cy="0"/>
+          <a:chOff x="0" y="0"/>
+          <a:chExt cx="0" cy="0"/>
+        </a:xfrm>
+      </p:grpSpPr>
+      <p:sp>
+        <p:nvSpPr>
+          <p:cNvPr id="2" name="Folienbildplatzhalter 1"/>
+          <p:cNvSpPr>
+            <a:spLocks noGrp="1" noRot="1" noChangeAspect="1"/>
+          </p:cNvSpPr>
+          <p:nvPr>
+            <p:ph type="sldImg"/>
+          </p:nvPr>
+        </p:nvSpPr>
+        <p:spPr/>
+      </p:sp>
+      <p:sp>
+        <p:nvSpPr>
+          <p:cNvPr id="3" name="Notizenplatzhalter 2"/>
+          <p:cNvSpPr>
+            <a:spLocks noGrp="1"/>
+          </p:cNvSpPr>
+          <p:nvPr>
+            <p:ph type="body" idx="1"/>
+          </p:nvPr>
+        </p:nvSpPr>
+        <p:spPr/>
+        <p:txBody>
+          <a:bodyPr/>
+          <a:lstStyle/>
+          <a:p>
+            <a:r>
+              <a:rPr lang="de-CH" dirty="0"/>
+              <a:t>Not </a:t>
+            </a:r>
+            <a:r>
+              <a:rPr lang="de-CH" dirty="0" err="1"/>
+              <a:t>counting</a:t>
+            </a:r>
+            <a:r>
+              <a:rPr lang="de-CH" dirty="0"/>
+              <a:t> instant </a:t>
+            </a:r>
+            <a:r>
+              <a:rPr lang="de-CH" dirty="0" err="1"/>
+              <a:t>messaging</a:t>
+            </a:r>
+            <a:r>
+              <a:rPr lang="de-CH" dirty="0"/>
+              <a:t> </a:t>
+            </a:r>
+            <a:r>
+              <a:rPr lang="de-CH" dirty="0" err="1"/>
+              <a:t>here</a:t>
+            </a:r>
+            <a:endParaRPr lang="de-CH" dirty="0"/>
+          </a:p>
+        </p:txBody>
+      </p:sp>
+      <p:sp>
+        <p:nvSpPr>
+          <p:cNvPr id="4" name="Foliennummernplatzhalter 3"/>
+          <p:cNvSpPr>
+            <a:spLocks noGrp="1"/>
+          </p:cNvSpPr>
+          <p:nvPr>
+            <p:ph type="sldNum" sz="quarter" idx="10"/>
+          </p:nvPr>
+        </p:nvSpPr>
+        <p:spPr/>
+        <p:txBody>
+          <a:bodyPr/>
+          <a:lstStyle/>
+          <a:p>
+            <a:fld id="{980D48BC-0EE9-4623-AA92-B80D74927229}" type="slidenum">
+              <a:rPr lang="de-CH" smtClean="0"/>
+              <a:t>3</a:t>
+            </a:fld>
+            <a:endParaRPr lang="de-CH"/>
+          </a:p>
+        </p:txBody>
+      </p:sp>
+    </p:spTree>
+    <p:extLst>
+      <p:ext uri="{BB962C8B-B14F-4D97-AF65-F5344CB8AC3E}">
+        <p14:creationId xmlns:p14="http://schemas.microsoft.com/office/powerpoint/2010/main" val="4129093122"/>
+      </p:ext>
+    </p:extLst>
+  </p:cSld>
+  <p:clrMapOvr>
+    <a:masterClrMapping/>
+  </p:clrMapOvr>
+</p:notes>
+</file>
+
+<file path=ppt/notesSlides/notesSlide3.xml><?xml version="1.0" encoding="utf-8"?>
+<p:notes xmlns:a="http://schemas.openxmlformats.org/drawingml/2006/main" xmlns:r="http://schemas.openxmlformats.org/officeDocument/2006/relationships" xmlns:p="http://schemas.openxmlformats.org/presentationml/2006/main">
+  <p:cSld>
+    <p:spTree>
+      <p:nvGrpSpPr>
+        <p:cNvPr id="1" name=""/>
+        <p:cNvGrpSpPr/>
+        <p:nvPr/>
+      </p:nvGrpSpPr>
+      <p:grpSpPr>
+        <a:xfrm>
+          <a:off x="0" y="0"/>
+          <a:ext cx="0" cy="0"/>
+          <a:chOff x="0" y="0"/>
+          <a:chExt cx="0" cy="0"/>
+        </a:xfrm>
+      </p:grpSpPr>
+      <p:sp>
+        <p:nvSpPr>
+          <p:cNvPr id="2" name="Folienbildplatzhalter 1"/>
+          <p:cNvSpPr>
+            <a:spLocks noGrp="1" noRot="1" noChangeAspect="1"/>
+          </p:cNvSpPr>
+          <p:nvPr>
+            <p:ph type="sldImg"/>
+          </p:nvPr>
+        </p:nvSpPr>
+        <p:spPr/>
+      </p:sp>
+      <p:sp>
+        <p:nvSpPr>
+          <p:cNvPr id="3" name="Notizenplatzhalter 2"/>
+          <p:cNvSpPr>
+            <a:spLocks noGrp="1"/>
+          </p:cNvSpPr>
+          <p:nvPr>
+            <p:ph type="body" idx="1"/>
+          </p:nvPr>
+        </p:nvSpPr>
+        <p:spPr/>
+        <p:txBody>
+          <a:bodyPr/>
+          <a:lstStyle/>
+          <a:p>
+            <a:r>
+              <a:rPr lang="de-CH" dirty="0"/>
+              <a:t>Different </a:t>
+            </a:r>
+            <a:r>
+              <a:rPr lang="de-CH" dirty="0" err="1"/>
+              <a:t>types</a:t>
+            </a:r>
+            <a:r>
+              <a:rPr lang="de-CH" dirty="0"/>
+              <a:t> </a:t>
+            </a:r>
+            <a:r>
+              <a:rPr lang="de-CH" dirty="0" err="1"/>
+              <a:t>of</a:t>
+            </a:r>
+            <a:r>
+              <a:rPr lang="de-CH" dirty="0"/>
+              <a:t> </a:t>
+            </a:r>
+            <a:r>
+              <a:rPr lang="de-CH" dirty="0" err="1"/>
+              <a:t>content</a:t>
+            </a:r>
+            <a:r>
+              <a:rPr lang="de-CH" dirty="0"/>
+              <a:t> (</a:t>
+            </a:r>
+            <a:r>
+              <a:rPr lang="de-CH" dirty="0" err="1"/>
+              <a:t>text</a:t>
+            </a:r>
+            <a:r>
+              <a:rPr lang="de-CH" dirty="0"/>
+              <a:t>, </a:t>
+            </a:r>
+            <a:r>
+              <a:rPr lang="de-CH" dirty="0" err="1"/>
+              <a:t>video</a:t>
+            </a:r>
+            <a:r>
+              <a:rPr lang="de-CH" dirty="0"/>
+              <a:t>, </a:t>
+            </a:r>
+            <a:r>
+              <a:rPr lang="de-CH" dirty="0" err="1"/>
+              <a:t>photos</a:t>
+            </a:r>
+            <a:r>
+              <a:rPr lang="de-CH" dirty="0"/>
+              <a:t>)</a:t>
+            </a:r>
+          </a:p>
+        </p:txBody>
+      </p:sp>
+      <p:sp>
+        <p:nvSpPr>
+          <p:cNvPr id="4" name="Foliennummernplatzhalter 3"/>
+          <p:cNvSpPr>
+            <a:spLocks noGrp="1"/>
+          </p:cNvSpPr>
+          <p:nvPr>
+            <p:ph type="sldNum" sz="quarter" idx="10"/>
+          </p:nvPr>
+        </p:nvSpPr>
+        <p:spPr/>
+        <p:txBody>
+          <a:bodyPr/>
+          <a:lstStyle/>
+          <a:p>
+            <a:fld id="{980D48BC-0EE9-4623-AA92-B80D74927229}" type="slidenum">
+              <a:rPr lang="de-CH" smtClean="0"/>
+              <a:t>4</a:t>
+            </a:fld>
+            <a:endParaRPr lang="de-CH"/>
+          </a:p>
+        </p:txBody>
+      </p:sp>
+    </p:spTree>
+    <p:extLst>
+      <p:ext uri="{BB962C8B-B14F-4D97-AF65-F5344CB8AC3E}">
+        <p14:creationId xmlns:p14="http://schemas.microsoft.com/office/powerpoint/2010/main" val="1594765118"/>
+      </p:ext>
+    </p:extLst>
+  </p:cSld>
+  <p:clrMapOvr>
+    <a:masterClrMapping/>
+  </p:clrMapOvr>
+</p:notes>
+</file>
+
+<file path=ppt/notesSlides/notesSlide4.xml><?xml version="1.0" encoding="utf-8"?>
+<p:notes xmlns:a="http://schemas.openxmlformats.org/drawingml/2006/main" xmlns:r="http://schemas.openxmlformats.org/officeDocument/2006/relationships" xmlns:p="http://schemas.openxmlformats.org/presentationml/2006/main">
+  <p:cSld>
+    <p:spTree>
+      <p:nvGrpSpPr>
+        <p:cNvPr id="1" name=""/>
+        <p:cNvGrpSpPr/>
+        <p:nvPr/>
+      </p:nvGrpSpPr>
+      <p:grpSpPr>
+        <a:xfrm>
+          <a:off x="0" y="0"/>
+          <a:ext cx="0" cy="0"/>
+          <a:chOff x="0" y="0"/>
+          <a:chExt cx="0" cy="0"/>
+        </a:xfrm>
+      </p:grpSpPr>
+      <p:sp>
+        <p:nvSpPr>
+          <p:cNvPr id="2" name="Folienbildplatzhalter 1"/>
+          <p:cNvSpPr>
+            <a:spLocks noGrp="1" noRot="1" noChangeAspect="1"/>
+          </p:cNvSpPr>
+          <p:nvPr>
+            <p:ph type="sldImg"/>
+          </p:nvPr>
+        </p:nvSpPr>
+        <p:spPr/>
+      </p:sp>
+      <p:sp>
+        <p:nvSpPr>
+          <p:cNvPr id="3" name="Notizenplatzhalter 2"/>
+          <p:cNvSpPr>
+            <a:spLocks noGrp="1"/>
+          </p:cNvSpPr>
+          <p:nvPr>
+            <p:ph type="body" idx="1"/>
+          </p:nvPr>
+        </p:nvSpPr>
+        <p:spPr/>
+        <p:txBody>
+          <a:bodyPr/>
+          <a:lstStyle/>
+          <a:p>
+            <a:pPr marL="0" marR="0" lvl="0" indent="0" algn="l" defTabSz="914400" rtl="0" eaLnBrk="1" fontAlgn="auto" latinLnBrk="0" hangingPunct="1">
+              <a:lnSpc>
+                <a:spcPct val="100000"/>
+              </a:lnSpc>
+              <a:spcBef>
+                <a:spcPts val="0"/>
+              </a:spcBef>
+              <a:spcAft>
+                <a:spcPts val="0"/>
+              </a:spcAft>
+              <a:buClrTx/>
+              <a:buSzTx/>
+              <a:buFontTx/>
+              <a:buNone/>
+              <a:tabLst/>
+              <a:defRPr/>
+            </a:pPr>
+            <a:r>
+              <a:rPr lang="de-CH" dirty="0"/>
+              <a:t>Way </a:t>
+            </a:r>
+            <a:r>
+              <a:rPr lang="de-CH" dirty="0" err="1"/>
+              <a:t>to</a:t>
+            </a:r>
+            <a:r>
+              <a:rPr lang="de-CH" dirty="0"/>
+              <a:t> </a:t>
+            </a:r>
+            <a:r>
+              <a:rPr lang="de-CH" dirty="0" err="1"/>
+              <a:t>reach</a:t>
+            </a:r>
+            <a:r>
+              <a:rPr lang="de-CH" dirty="0"/>
+              <a:t> a </a:t>
+            </a:r>
+            <a:r>
+              <a:rPr lang="de-CH" dirty="0" err="1"/>
+              <a:t>lot</a:t>
+            </a:r>
+            <a:r>
+              <a:rPr lang="de-CH" dirty="0"/>
+              <a:t> </a:t>
+            </a:r>
+            <a:r>
+              <a:rPr lang="de-CH" dirty="0" err="1"/>
+              <a:t>of</a:t>
+            </a:r>
+            <a:r>
+              <a:rPr lang="de-CH" dirty="0"/>
+              <a:t> </a:t>
+            </a:r>
+            <a:r>
+              <a:rPr lang="de-CH" dirty="0" err="1"/>
+              <a:t>people</a:t>
+            </a:r>
+            <a:endParaRPr lang="de-CH" dirty="0"/>
+          </a:p>
+          <a:p>
+            <a:r>
+              <a:rPr lang="de-CH" dirty="0" err="1"/>
+              <a:t>Advertisment</a:t>
+            </a:r>
+            <a:r>
+              <a:rPr lang="de-CH" dirty="0"/>
+              <a:t> </a:t>
+            </a:r>
+            <a:r>
+              <a:rPr lang="de-CH" dirty="0" err="1"/>
+              <a:t>of</a:t>
+            </a:r>
+            <a:r>
+              <a:rPr lang="de-CH" dirty="0"/>
+              <a:t> </a:t>
+            </a:r>
+            <a:r>
+              <a:rPr lang="de-CH" dirty="0" err="1"/>
+              <a:t>products</a:t>
+            </a:r>
+            <a:r>
+              <a:rPr lang="de-CH" dirty="0"/>
+              <a:t> (</a:t>
+            </a:r>
+            <a:r>
+              <a:rPr lang="de-CH" dirty="0" err="1"/>
+              <a:t>videos</a:t>
+            </a:r>
+            <a:r>
+              <a:rPr lang="de-CH" dirty="0"/>
+              <a:t>!)</a:t>
+            </a:r>
+          </a:p>
+          <a:p>
+            <a:r>
+              <a:rPr lang="de-CH" dirty="0" err="1"/>
+              <a:t>Getting</a:t>
+            </a:r>
+            <a:r>
+              <a:rPr lang="de-CH" dirty="0"/>
+              <a:t> </a:t>
+            </a:r>
+            <a:r>
+              <a:rPr lang="de-CH" dirty="0" err="1"/>
+              <a:t>your</a:t>
+            </a:r>
+            <a:r>
+              <a:rPr lang="de-CH" dirty="0"/>
+              <a:t> </a:t>
+            </a:r>
+            <a:r>
+              <a:rPr lang="de-CH" dirty="0" err="1"/>
+              <a:t>brand</a:t>
+            </a:r>
+            <a:r>
+              <a:rPr lang="de-CH" dirty="0"/>
+              <a:t> out </a:t>
+            </a:r>
+            <a:r>
+              <a:rPr lang="de-CH" dirty="0" err="1"/>
+              <a:t>there</a:t>
+            </a:r>
+            <a:r>
+              <a:rPr lang="de-CH" dirty="0"/>
+              <a:t>, #</a:t>
+            </a:r>
+            <a:r>
+              <a:rPr lang="de-CH" dirty="0" err="1"/>
+              <a:t>hashtags</a:t>
+            </a:r>
+            <a:endParaRPr lang="de-CH" dirty="0"/>
+          </a:p>
+          <a:p>
+            <a:r>
+              <a:rPr lang="de-CH" dirty="0" err="1"/>
+              <a:t>Direct</a:t>
+            </a:r>
+            <a:r>
+              <a:rPr lang="de-CH" dirty="0"/>
+              <a:t> </a:t>
+            </a:r>
+            <a:r>
+              <a:rPr lang="de-CH" dirty="0" err="1"/>
+              <a:t>interaction</a:t>
+            </a:r>
+            <a:r>
+              <a:rPr lang="de-CH" dirty="0"/>
+              <a:t> </a:t>
+            </a:r>
+            <a:r>
+              <a:rPr lang="de-CH" dirty="0" err="1"/>
+              <a:t>with</a:t>
+            </a:r>
+            <a:r>
+              <a:rPr lang="de-CH" dirty="0"/>
+              <a:t> </a:t>
+            </a:r>
+            <a:r>
+              <a:rPr lang="de-CH" dirty="0" err="1"/>
+              <a:t>customers</a:t>
+            </a:r>
+            <a:endParaRPr lang="de-CH" dirty="0"/>
+          </a:p>
+        </p:txBody>
+      </p:sp>
+      <p:sp>
+        <p:nvSpPr>
+          <p:cNvPr id="4" name="Foliennummernplatzhalter 3"/>
+          <p:cNvSpPr>
+            <a:spLocks noGrp="1"/>
+          </p:cNvSpPr>
+          <p:nvPr>
+            <p:ph type="sldNum" sz="quarter" idx="10"/>
+          </p:nvPr>
+        </p:nvSpPr>
+        <p:spPr/>
+        <p:txBody>
+          <a:bodyPr/>
+          <a:lstStyle/>
+          <a:p>
+            <a:fld id="{980D48BC-0EE9-4623-AA92-B80D74927229}" type="slidenum">
+              <a:rPr lang="de-CH" smtClean="0"/>
+              <a:t>5</a:t>
+            </a:fld>
+            <a:endParaRPr lang="de-CH"/>
+          </a:p>
+        </p:txBody>
+      </p:sp>
+    </p:spTree>
+    <p:extLst>
+      <p:ext uri="{BB962C8B-B14F-4D97-AF65-F5344CB8AC3E}">
+        <p14:creationId xmlns:p14="http://schemas.microsoft.com/office/powerpoint/2010/main" val="3157147351"/>
+      </p:ext>
+    </p:extLst>
+  </p:cSld>
+  <p:clrMapOvr>
+    <a:masterClrMapping/>
+  </p:clrMapOvr>
+</p:notes>
+</file>
+
+<file path=ppt/notesSlides/notesSlide5.xml><?xml version="1.0" encoding="utf-8"?>
+<p:notes xmlns:a="http://schemas.openxmlformats.org/drawingml/2006/main" xmlns:r="http://schemas.openxmlformats.org/officeDocument/2006/relationships" xmlns:p="http://schemas.openxmlformats.org/presentationml/2006/main">
+  <p:cSld>
+    <p:spTree>
+      <p:nvGrpSpPr>
+        <p:cNvPr id="1" name=""/>
+        <p:cNvGrpSpPr/>
+        <p:nvPr/>
+      </p:nvGrpSpPr>
+      <p:grpSpPr>
+        <a:xfrm>
+          <a:off x="0" y="0"/>
+          <a:ext cx="0" cy="0"/>
+          <a:chOff x="0" y="0"/>
+          <a:chExt cx="0" cy="0"/>
+        </a:xfrm>
+      </p:grpSpPr>
+      <p:sp>
+        <p:nvSpPr>
+          <p:cNvPr id="2" name="Folienbildplatzhalter 1"/>
+          <p:cNvSpPr>
+            <a:spLocks noGrp="1" noRot="1" noChangeAspect="1"/>
+          </p:cNvSpPr>
+          <p:nvPr>
+            <p:ph type="sldImg"/>
+          </p:nvPr>
+        </p:nvSpPr>
+        <p:spPr/>
+      </p:sp>
+      <p:sp>
+        <p:nvSpPr>
+          <p:cNvPr id="3" name="Notizenplatzhalter 2"/>
+          <p:cNvSpPr>
+            <a:spLocks noGrp="1"/>
+          </p:cNvSpPr>
+          <p:nvPr>
+            <p:ph type="body" idx="1"/>
+          </p:nvPr>
+        </p:nvSpPr>
+        <p:spPr/>
+        <p:txBody>
+          <a:bodyPr/>
+          <a:lstStyle/>
+          <a:p>
+            <a:r>
+              <a:rPr lang="de-CH" dirty="0"/>
+              <a:t>People </a:t>
+            </a:r>
+            <a:r>
+              <a:rPr lang="de-CH" dirty="0" err="1"/>
+              <a:t>that</a:t>
+            </a:r>
+            <a:r>
+              <a:rPr lang="de-CH" dirty="0"/>
+              <a:t> live </a:t>
+            </a:r>
+            <a:r>
+              <a:rPr lang="de-CH" dirty="0" err="1"/>
+              <a:t>far</a:t>
+            </a:r>
+            <a:r>
+              <a:rPr lang="de-CH" dirty="0"/>
+              <a:t> </a:t>
+            </a:r>
+            <a:r>
+              <a:rPr lang="de-CH" dirty="0" err="1"/>
+              <a:t>away</a:t>
+            </a:r>
+            <a:r>
+              <a:rPr lang="de-CH" dirty="0"/>
+              <a:t> </a:t>
+            </a:r>
+            <a:r>
+              <a:rPr lang="de-CH" dirty="0" err="1"/>
+              <a:t>or</a:t>
+            </a:r>
+            <a:r>
+              <a:rPr lang="de-CH" dirty="0"/>
+              <a:t> </a:t>
+            </a:r>
+            <a:r>
+              <a:rPr lang="de-CH" dirty="0" err="1"/>
+              <a:t>even</a:t>
+            </a:r>
+            <a:r>
+              <a:rPr lang="de-CH" dirty="0"/>
+              <a:t> in </a:t>
+            </a:r>
+            <a:r>
+              <a:rPr lang="de-CH" dirty="0" err="1"/>
+              <a:t>other</a:t>
+            </a:r>
+            <a:r>
+              <a:rPr lang="de-CH" dirty="0"/>
+              <a:t> countries.</a:t>
+            </a:r>
+          </a:p>
+          <a:p>
+            <a:r>
+              <a:rPr lang="de-CH" dirty="0"/>
+              <a:t>Sharing </a:t>
+            </a:r>
+            <a:r>
+              <a:rPr lang="de-CH" dirty="0" err="1"/>
+              <a:t>videos</a:t>
+            </a:r>
+            <a:r>
+              <a:rPr lang="de-CH" dirty="0"/>
+              <a:t> and </a:t>
+            </a:r>
+            <a:r>
+              <a:rPr lang="de-CH" dirty="0" err="1"/>
+              <a:t>photos</a:t>
+            </a:r>
+            <a:endParaRPr lang="de-CH" dirty="0"/>
+          </a:p>
+        </p:txBody>
+      </p:sp>
+      <p:sp>
+        <p:nvSpPr>
+          <p:cNvPr id="4" name="Foliennummernplatzhalter 3"/>
+          <p:cNvSpPr>
+            <a:spLocks noGrp="1"/>
+          </p:cNvSpPr>
+          <p:nvPr>
+            <p:ph type="sldNum" sz="quarter" idx="10"/>
+          </p:nvPr>
+        </p:nvSpPr>
+        <p:spPr/>
+        <p:txBody>
+          <a:bodyPr/>
+          <a:lstStyle/>
+          <a:p>
+            <a:fld id="{980D48BC-0EE9-4623-AA92-B80D74927229}" type="slidenum">
+              <a:rPr lang="de-CH" smtClean="0"/>
+              <a:t>6</a:t>
+            </a:fld>
+            <a:endParaRPr lang="de-CH"/>
+          </a:p>
+        </p:txBody>
+      </p:sp>
+    </p:spTree>
+    <p:extLst>
+      <p:ext uri="{BB962C8B-B14F-4D97-AF65-F5344CB8AC3E}">
+        <p14:creationId xmlns:p14="http://schemas.microsoft.com/office/powerpoint/2010/main" val="2499769559"/>
+      </p:ext>
+    </p:extLst>
+  </p:cSld>
+  <p:clrMapOvr>
+    <a:masterClrMapping/>
+  </p:clrMapOvr>
+</p:notes>
+</file>
+
+<file path=ppt/notesSlides/notesSlide6.xml><?xml version="1.0" encoding="utf-8"?>
+<p:notes xmlns:a="http://schemas.openxmlformats.org/drawingml/2006/main" xmlns:r="http://schemas.openxmlformats.org/officeDocument/2006/relationships" xmlns:p="http://schemas.openxmlformats.org/presentationml/2006/main">
+  <p:cSld>
+    <p:spTree>
+      <p:nvGrpSpPr>
+        <p:cNvPr id="1" name=""/>
+        <p:cNvGrpSpPr/>
+        <p:nvPr/>
+      </p:nvGrpSpPr>
+      <p:grpSpPr>
+        <a:xfrm>
+          <a:off x="0" y="0"/>
+          <a:ext cx="0" cy="0"/>
+          <a:chOff x="0" y="0"/>
+          <a:chExt cx="0" cy="0"/>
+        </a:xfrm>
+      </p:grpSpPr>
+      <p:sp>
+        <p:nvSpPr>
+          <p:cNvPr id="2" name="Folienbildplatzhalter 1"/>
+          <p:cNvSpPr>
+            <a:spLocks noGrp="1" noRot="1" noChangeAspect="1"/>
+          </p:cNvSpPr>
+          <p:nvPr>
+            <p:ph type="sldImg"/>
+          </p:nvPr>
+        </p:nvSpPr>
+        <p:spPr/>
+      </p:sp>
+      <p:sp>
+        <p:nvSpPr>
+          <p:cNvPr id="3" name="Notizenplatzhalter 2"/>
+          <p:cNvSpPr>
+            <a:spLocks noGrp="1"/>
+          </p:cNvSpPr>
+          <p:nvPr>
+            <p:ph type="body" idx="1"/>
+          </p:nvPr>
+        </p:nvSpPr>
+        <p:spPr/>
+        <p:txBody>
+          <a:bodyPr/>
+          <a:lstStyle/>
+          <a:p>
+            <a:r>
+              <a:rPr lang="de-CH" dirty="0" err="1"/>
+              <a:t>No</a:t>
+            </a:r>
+            <a:r>
+              <a:rPr lang="de-CH" dirty="0"/>
+              <a:t> real </a:t>
+            </a:r>
+            <a:r>
+              <a:rPr lang="de-CH" dirty="0" err="1"/>
+              <a:t>need</a:t>
+            </a:r>
+            <a:r>
+              <a:rPr lang="de-CH" dirty="0"/>
+              <a:t> </a:t>
+            </a:r>
+            <a:r>
+              <a:rPr lang="de-CH" dirty="0" err="1"/>
+              <a:t>to</a:t>
+            </a:r>
+            <a:r>
+              <a:rPr lang="de-CH" dirty="0"/>
+              <a:t> </a:t>
+            </a:r>
+            <a:r>
+              <a:rPr lang="de-CH" dirty="0" err="1"/>
+              <a:t>get</a:t>
+            </a:r>
+            <a:r>
+              <a:rPr lang="de-CH" dirty="0"/>
+              <a:t> in </a:t>
+            </a:r>
+            <a:r>
+              <a:rPr lang="de-CH" dirty="0" err="1"/>
+              <a:t>contact</a:t>
+            </a:r>
+            <a:r>
+              <a:rPr lang="de-CH" dirty="0"/>
+              <a:t> </a:t>
+            </a:r>
+            <a:r>
+              <a:rPr lang="de-CH" dirty="0" err="1"/>
+              <a:t>with</a:t>
+            </a:r>
+            <a:r>
+              <a:rPr lang="de-CH" dirty="0"/>
+              <a:t> individual </a:t>
+            </a:r>
+            <a:r>
+              <a:rPr lang="de-CH" dirty="0" err="1"/>
+              <a:t>people</a:t>
+            </a:r>
+            <a:endParaRPr lang="de-CH" dirty="0"/>
+          </a:p>
+        </p:txBody>
+      </p:sp>
+      <p:sp>
+        <p:nvSpPr>
+          <p:cNvPr id="4" name="Foliennummernplatzhalter 3"/>
+          <p:cNvSpPr>
+            <a:spLocks noGrp="1"/>
+          </p:cNvSpPr>
+          <p:nvPr>
+            <p:ph type="sldNum" sz="quarter" idx="10"/>
+          </p:nvPr>
+        </p:nvSpPr>
+        <p:spPr/>
+        <p:txBody>
+          <a:bodyPr/>
+          <a:lstStyle/>
+          <a:p>
+            <a:fld id="{980D48BC-0EE9-4623-AA92-B80D74927229}" type="slidenum">
+              <a:rPr lang="de-CH" smtClean="0"/>
+              <a:t>7</a:t>
+            </a:fld>
+            <a:endParaRPr lang="de-CH"/>
+          </a:p>
+        </p:txBody>
+      </p:sp>
+    </p:spTree>
+    <p:extLst>
+      <p:ext uri="{BB962C8B-B14F-4D97-AF65-F5344CB8AC3E}">
+        <p14:creationId xmlns:p14="http://schemas.microsoft.com/office/powerpoint/2010/main" val="437758947"/>
+      </p:ext>
+    </p:extLst>
+  </p:cSld>
+  <p:clrMapOvr>
+    <a:masterClrMapping/>
+  </p:clrMapOvr>
+</p:notes>
+</file>
+
+<file path=ppt/notesSlides/notesSlide7.xml><?xml version="1.0" encoding="utf-8"?>
+<p:notes xmlns:a="http://schemas.openxmlformats.org/drawingml/2006/main" xmlns:r="http://schemas.openxmlformats.org/officeDocument/2006/relationships" xmlns:p="http://schemas.openxmlformats.org/presentationml/2006/main">
+  <p:cSld>
+    <p:spTree>
+      <p:nvGrpSpPr>
+        <p:cNvPr id="1" name=""/>
+        <p:cNvGrpSpPr/>
+        <p:nvPr/>
+      </p:nvGrpSpPr>
+      <p:grpSpPr>
+        <a:xfrm>
+          <a:off x="0" y="0"/>
+          <a:ext cx="0" cy="0"/>
+          <a:chOff x="0" y="0"/>
+          <a:chExt cx="0" cy="0"/>
+        </a:xfrm>
+      </p:grpSpPr>
+      <p:sp>
+        <p:nvSpPr>
+          <p:cNvPr id="2" name="Folienbildplatzhalter 1"/>
+          <p:cNvSpPr>
+            <a:spLocks noGrp="1" noRot="1" noChangeAspect="1"/>
+          </p:cNvSpPr>
+          <p:nvPr>
+            <p:ph type="sldImg"/>
+          </p:nvPr>
+        </p:nvSpPr>
+        <p:spPr/>
+      </p:sp>
+      <p:sp>
+        <p:nvSpPr>
+          <p:cNvPr id="3" name="Notizenplatzhalter 2"/>
+          <p:cNvSpPr>
+            <a:spLocks noGrp="1"/>
+          </p:cNvSpPr>
+          <p:nvPr>
+            <p:ph type="body" idx="1"/>
+          </p:nvPr>
+        </p:nvSpPr>
+        <p:spPr/>
+        <p:txBody>
+          <a:bodyPr/>
+          <a:lstStyle/>
+          <a:p>
+            <a:r>
+              <a:rPr lang="de-CH" dirty="0"/>
+              <a:t>Twitter: Keeping </a:t>
+            </a:r>
+            <a:r>
+              <a:rPr lang="de-CH" dirty="0" err="1"/>
+              <a:t>contact</a:t>
+            </a:r>
+            <a:r>
+              <a:rPr lang="de-CH" dirty="0"/>
+              <a:t> </a:t>
+            </a:r>
+            <a:r>
+              <a:rPr lang="de-CH" dirty="0" err="1"/>
+              <a:t>with</a:t>
+            </a:r>
+            <a:r>
+              <a:rPr lang="de-CH" dirty="0"/>
+              <a:t> </a:t>
+            </a:r>
+            <a:r>
+              <a:rPr lang="de-CH" dirty="0" err="1"/>
+              <a:t>some</a:t>
+            </a:r>
+            <a:r>
+              <a:rPr lang="de-CH" dirty="0"/>
+              <a:t> </a:t>
+            </a:r>
+            <a:r>
+              <a:rPr lang="de-CH" dirty="0" err="1"/>
+              <a:t>people</a:t>
+            </a:r>
+            <a:r>
+              <a:rPr lang="de-CH" dirty="0"/>
+              <a:t>, </a:t>
+            </a:r>
+            <a:r>
+              <a:rPr lang="de-CH" dirty="0" err="1"/>
+              <a:t>news</a:t>
+            </a:r>
+            <a:endParaRPr lang="de-CH" dirty="0"/>
+          </a:p>
+          <a:p>
+            <a:r>
+              <a:rPr lang="de-CH" dirty="0"/>
+              <a:t>LinkedIn: Very passive </a:t>
+            </a:r>
+            <a:r>
+              <a:rPr lang="de-CH" dirty="0" err="1"/>
+              <a:t>use</a:t>
+            </a:r>
+            <a:r>
+              <a:rPr lang="de-CH" dirty="0"/>
+              <a:t> </a:t>
+            </a:r>
+            <a:r>
+              <a:rPr lang="de-CH" dirty="0" err="1"/>
+              <a:t>for</a:t>
+            </a:r>
+            <a:r>
+              <a:rPr lang="de-CH" dirty="0"/>
+              <a:t> </a:t>
+            </a:r>
+            <a:r>
+              <a:rPr lang="de-CH" dirty="0" err="1"/>
+              <a:t>my</a:t>
+            </a:r>
+            <a:r>
+              <a:rPr lang="de-CH" dirty="0"/>
+              <a:t> </a:t>
+            </a:r>
+            <a:r>
+              <a:rPr lang="de-CH" dirty="0" err="1"/>
+              <a:t>job</a:t>
+            </a:r>
+            <a:r>
+              <a:rPr lang="de-CH" dirty="0"/>
+              <a:t> </a:t>
+            </a:r>
+            <a:r>
+              <a:rPr lang="de-CH" dirty="0" err="1"/>
+              <a:t>portfolio</a:t>
+            </a:r>
+            <a:endParaRPr lang="de-CH" dirty="0"/>
+          </a:p>
+        </p:txBody>
+      </p:sp>
+      <p:sp>
+        <p:nvSpPr>
+          <p:cNvPr id="4" name="Foliennummernplatzhalter 3"/>
+          <p:cNvSpPr>
+            <a:spLocks noGrp="1"/>
+          </p:cNvSpPr>
+          <p:nvPr>
+            <p:ph type="sldNum" sz="quarter" idx="10"/>
+          </p:nvPr>
+        </p:nvSpPr>
+        <p:spPr/>
+        <p:txBody>
+          <a:bodyPr/>
+          <a:lstStyle/>
+          <a:p>
+            <a:fld id="{980D48BC-0EE9-4623-AA92-B80D74927229}" type="slidenum">
+              <a:rPr lang="de-CH" smtClean="0"/>
+              <a:t>8</a:t>
+            </a:fld>
+            <a:endParaRPr lang="de-CH"/>
+          </a:p>
+        </p:txBody>
+      </p:sp>
+    </p:spTree>
+    <p:extLst>
+      <p:ext uri="{BB962C8B-B14F-4D97-AF65-F5344CB8AC3E}">
+        <p14:creationId xmlns:p14="http://schemas.microsoft.com/office/powerpoint/2010/main" val="2915397042"/>
+      </p:ext>
+    </p:extLst>
+  </p:cSld>
+  <p:clrMapOvr>
+    <a:masterClrMapping/>
+  </p:clrMapOvr>
+</p:notes>
+</file>
+
+<file path=ppt/notesSlides/notesSlide8.xml><?xml version="1.0" encoding="utf-8"?>
+<p:notes xmlns:a="http://schemas.openxmlformats.org/drawingml/2006/main" xmlns:r="http://schemas.openxmlformats.org/officeDocument/2006/relationships" xmlns:p="http://schemas.openxmlformats.org/presentationml/2006/main">
+  <p:cSld>
+    <p:spTree>
+      <p:nvGrpSpPr>
+        <p:cNvPr id="1" name=""/>
+        <p:cNvGrpSpPr/>
+        <p:nvPr/>
+      </p:nvGrpSpPr>
+      <p:grpSpPr>
+        <a:xfrm>
+          <a:off x="0" y="0"/>
+          <a:ext cx="0" cy="0"/>
+          <a:chOff x="0" y="0"/>
+          <a:chExt cx="0" cy="0"/>
+        </a:xfrm>
+      </p:grpSpPr>
+      <p:sp>
+        <p:nvSpPr>
+          <p:cNvPr id="2" name="Folienbildplatzhalter 1"/>
+          <p:cNvSpPr>
+            <a:spLocks noGrp="1" noRot="1" noChangeAspect="1"/>
+          </p:cNvSpPr>
+          <p:nvPr>
+            <p:ph type="sldImg"/>
+          </p:nvPr>
+        </p:nvSpPr>
+        <p:spPr/>
+      </p:sp>
+      <p:sp>
+        <p:nvSpPr>
+          <p:cNvPr id="3" name="Notizenplatzhalter 2"/>
+          <p:cNvSpPr>
+            <a:spLocks noGrp="1"/>
+          </p:cNvSpPr>
+          <p:nvPr>
+            <p:ph type="body" idx="1"/>
+          </p:nvPr>
+        </p:nvSpPr>
+        <p:spPr/>
+        <p:txBody>
+          <a:bodyPr/>
+          <a:lstStyle/>
+          <a:p>
+            <a:r>
+              <a:rPr lang="de-CH" dirty="0"/>
+              <a:t>Do </a:t>
+            </a:r>
+            <a:r>
+              <a:rPr lang="de-CH" dirty="0" err="1"/>
+              <a:t>you</a:t>
+            </a:r>
+            <a:r>
+              <a:rPr lang="de-CH" dirty="0"/>
+              <a:t> </a:t>
+            </a:r>
+            <a:r>
+              <a:rPr lang="de-CH" dirty="0" err="1"/>
+              <a:t>have</a:t>
+            </a:r>
+            <a:r>
+              <a:rPr lang="de-CH" dirty="0"/>
+              <a:t> </a:t>
+            </a:r>
+            <a:r>
+              <a:rPr lang="de-CH" dirty="0" err="1"/>
+              <a:t>any</a:t>
+            </a:r>
+            <a:r>
+              <a:rPr lang="de-CH" dirty="0"/>
+              <a:t> </a:t>
+            </a:r>
+            <a:r>
+              <a:rPr lang="de-CH" dirty="0" err="1"/>
+              <a:t>questions</a:t>
+            </a:r>
+            <a:r>
+              <a:rPr lang="de-CH" dirty="0"/>
+              <a:t>?</a:t>
+            </a:r>
+          </a:p>
+        </p:txBody>
+      </p:sp>
+      <p:sp>
+        <p:nvSpPr>
+          <p:cNvPr id="4" name="Foliennummernplatzhalter 3"/>
+          <p:cNvSpPr>
+            <a:spLocks noGrp="1"/>
+          </p:cNvSpPr>
+          <p:nvPr>
+            <p:ph type="sldNum" sz="quarter" idx="10"/>
+          </p:nvPr>
+        </p:nvSpPr>
+        <p:spPr/>
+        <p:txBody>
+          <a:bodyPr/>
+          <a:lstStyle/>
+          <a:p>
+            <a:fld id="{980D48BC-0EE9-4623-AA92-B80D74927229}" type="slidenum">
+              <a:rPr lang="de-CH" smtClean="0"/>
+              <a:t>9</a:t>
+            </a:fld>
+            <a:endParaRPr lang="de-CH"/>
+          </a:p>
+        </p:txBody>
+      </p:sp>
+    </p:spTree>
+    <p:extLst>
+      <p:ext uri="{BB962C8B-B14F-4D97-AF65-F5344CB8AC3E}">
+        <p14:creationId xmlns:p14="http://schemas.microsoft.com/office/powerpoint/2010/main" val="3889967372"/>
+      </p:ext>
+    </p:extLst>
+  </p:cSld>
+  <p:clrMapOvr>
+    <a:masterClrMapping/>
+  </p:clrMapOvr>
+</p:notes>
+</file>
+
 <file path=ppt/slideLayouts/slideLayout1.xml><?xml version="1.0" encoding="utf-8"?>
 <p:sldLayout xmlns:a="http://schemas.openxmlformats.org/drawingml/2006/main" xmlns:r="http://schemas.openxmlformats.org/officeDocument/2006/relationships" xmlns:p="http://schemas.openxmlformats.org/presentationml/2006/main" type="title" preserve="1">
   <p:cSld name="Titelfolie">
@@ -1903,7 +3054,7 @@
           <a:p>
             <a:fld id="{FB12F51F-E54E-480B-AF2C-8834D4129A4E}" type="datetimeFigureOut">
               <a:rPr lang="de-CH" smtClean="0"/>
-              <a:t>07.12.2017</a:t>
+              <a:t>08.12.2017</a:t>
             </a:fld>
             <a:endParaRPr lang="de-CH"/>
           </a:p>
@@ -3362,7 +4513,7 @@
           <a:p>
             <a:fld id="{FB12F51F-E54E-480B-AF2C-8834D4129A4E}" type="datetimeFigureOut">
               <a:rPr lang="de-CH" smtClean="0"/>
-              <a:t>07.12.2017</a:t>
+              <a:t>08.12.2017</a:t>
             </a:fld>
             <a:endParaRPr lang="de-CH"/>
           </a:p>
@@ -4815,7 +5966,7 @@
           <a:p>
             <a:fld id="{FB12F51F-E54E-480B-AF2C-8834D4129A4E}" type="datetimeFigureOut">
               <a:rPr lang="de-CH" smtClean="0"/>
-              <a:t>07.12.2017</a:t>
+              <a:t>08.12.2017</a:t>
             </a:fld>
             <a:endParaRPr lang="de-CH"/>
           </a:p>
@@ -6270,7 +7421,7 @@
           <a:p>
             <a:fld id="{FB12F51F-E54E-480B-AF2C-8834D4129A4E}" type="datetimeFigureOut">
               <a:rPr lang="de-CH" smtClean="0"/>
-              <a:t>07.12.2017</a:t>
+              <a:t>08.12.2017</a:t>
             </a:fld>
             <a:endParaRPr lang="de-CH"/>
           </a:p>
@@ -7778,7 +8929,7 @@
           <a:p>
             <a:fld id="{FB12F51F-E54E-480B-AF2C-8834D4129A4E}" type="datetimeFigureOut">
               <a:rPr lang="de-CH" smtClean="0"/>
-              <a:t>07.12.2017</a:t>
+              <a:t>08.12.2017</a:t>
             </a:fld>
             <a:endParaRPr lang="de-CH"/>
           </a:p>
@@ -9299,7 +10450,7 @@
           <a:p>
             <a:fld id="{FB12F51F-E54E-480B-AF2C-8834D4129A4E}" type="datetimeFigureOut">
               <a:rPr lang="de-CH" smtClean="0"/>
-              <a:t>07.12.2017</a:t>
+              <a:t>08.12.2017</a:t>
             </a:fld>
             <a:endParaRPr lang="de-CH"/>
           </a:p>
@@ -10964,7 +12115,7 @@
           <a:p>
             <a:fld id="{FB12F51F-E54E-480B-AF2C-8834D4129A4E}" type="datetimeFigureOut">
               <a:rPr lang="de-CH" smtClean="0"/>
-              <a:t>07.12.2017</a:t>
+              <a:t>08.12.2017</a:t>
             </a:fld>
             <a:endParaRPr lang="de-CH"/>
           </a:p>
@@ -12362,7 +13513,7 @@
           <a:p>
             <a:fld id="{FB12F51F-E54E-480B-AF2C-8834D4129A4E}" type="datetimeFigureOut">
               <a:rPr lang="de-CH" smtClean="0"/>
-              <a:t>07.12.2017</a:t>
+              <a:t>08.12.2017</a:t>
             </a:fld>
             <a:endParaRPr lang="de-CH"/>
           </a:p>
@@ -12462,7 +13613,7 @@
           <a:p>
             <a:fld id="{FB12F51F-E54E-480B-AF2C-8834D4129A4E}" type="datetimeFigureOut">
               <a:rPr lang="de-CH" smtClean="0"/>
-              <a:t>07.12.2017</a:t>
+              <a:t>08.12.2017</a:t>
             </a:fld>
             <a:endParaRPr lang="de-CH"/>
           </a:p>
@@ -13988,7 +15139,7 @@
           <a:p>
             <a:fld id="{FB12F51F-E54E-480B-AF2C-8834D4129A4E}" type="datetimeFigureOut">
               <a:rPr lang="de-CH" smtClean="0"/>
-              <a:t>07.12.2017</a:t>
+              <a:t>08.12.2017</a:t>
             </a:fld>
             <a:endParaRPr lang="de-CH"/>
           </a:p>
@@ -15524,7 +16675,7 @@
           <a:p>
             <a:fld id="{FB12F51F-E54E-480B-AF2C-8834D4129A4E}" type="datetimeFigureOut">
               <a:rPr lang="de-CH" smtClean="0"/>
-              <a:t>07.12.2017</a:t>
+              <a:t>08.12.2017</a:t>
             </a:fld>
             <a:endParaRPr lang="de-CH"/>
           </a:p>
@@ -15774,7 +16925,7 @@
           <a:p>
             <a:fld id="{FB12F51F-E54E-480B-AF2C-8834D4129A4E}" type="datetimeFigureOut">
               <a:rPr lang="de-CH" smtClean="0"/>
-              <a:t>07.12.2017</a:t>
+              <a:t>08.12.2017</a:t>
             </a:fld>
             <a:endParaRPr lang="de-CH"/>
           </a:p>
@@ -16600,14 +17751,149 @@
               <a:t>Twitter</a:t>
             </a:r>
           </a:p>
-          <a:p>
-            <a:r>
-              <a:rPr lang="de-CH" dirty="0"/>
-              <a:t>Reddit</a:t>
-            </a:r>
-          </a:p>
         </p:txBody>
       </p:sp>
+      <p:pic>
+        <p:nvPicPr>
+          <p:cNvPr id="2050" name="Picture 2" descr="https://www.facebook.com/images/fb_icon_325x325.png">
+            <a:extLst>
+              <a:ext uri="{FF2B5EF4-FFF2-40B4-BE49-F238E27FC236}">
+                <a16:creationId xmlns:a16="http://schemas.microsoft.com/office/drawing/2014/main" id="{44A6C5D1-7E01-4568-BF97-03E1ACF61905}"/>
+              </a:ext>
+            </a:extLst>
+          </p:cNvPr>
+          <p:cNvPicPr>
+            <a:picLocks noChangeAspect="1" noChangeArrowheads="1"/>
+          </p:cNvPicPr>
+          <p:nvPr/>
+        </p:nvPicPr>
+        <p:blipFill>
+          <a:blip r:embed="rId3">
+            <a:extLst>
+              <a:ext uri="{28A0092B-C50C-407E-A947-70E740481C1C}">
+                <a14:useLocalDpi xmlns:a14="http://schemas.microsoft.com/office/drawing/2010/main" val="0"/>
+              </a:ext>
+            </a:extLst>
+          </a:blip>
+          <a:srcRect/>
+          <a:stretch>
+            <a:fillRect/>
+          </a:stretch>
+        </p:blipFill>
+        <p:spPr bwMode="auto">
+          <a:xfrm>
+            <a:off x="8701640" y="1033054"/>
+            <a:ext cx="1279261" cy="1279261"/>
+          </a:xfrm>
+          <a:prstGeom prst="rect">
+            <a:avLst/>
+          </a:prstGeom>
+          <a:noFill/>
+          <a:extLst>
+            <a:ext uri="{909E8E84-426E-40DD-AFC4-6F175D3DCCD1}">
+              <a14:hiddenFill xmlns:a14="http://schemas.microsoft.com/office/drawing/2010/main">
+                <a:solidFill>
+                  <a:srgbClr val="FFFFFF"/>
+                </a:solidFill>
+              </a14:hiddenFill>
+            </a:ext>
+          </a:extLst>
+        </p:spPr>
+      </p:pic>
+      <p:pic>
+        <p:nvPicPr>
+          <p:cNvPr id="2052" name="Picture 4" descr="https://upload.wikimedia.org/wikipedia/commons/thumb/9/90/Logo_of_YouTube_%282013-2015%29.svg/1200px-Logo_of_YouTube_%282013-2015%29.svg.png">
+            <a:extLst>
+              <a:ext uri="{FF2B5EF4-FFF2-40B4-BE49-F238E27FC236}">
+                <a16:creationId xmlns:a16="http://schemas.microsoft.com/office/drawing/2014/main" id="{3DAAE4FA-031E-4EAC-81AB-5D9D96A18ABD}"/>
+              </a:ext>
+            </a:extLst>
+          </p:cNvPr>
+          <p:cNvPicPr>
+            <a:picLocks noChangeAspect="1" noChangeArrowheads="1"/>
+          </p:cNvPicPr>
+          <p:nvPr/>
+        </p:nvPicPr>
+        <p:blipFill>
+          <a:blip r:embed="rId4">
+            <a:extLst>
+              <a:ext uri="{28A0092B-C50C-407E-A947-70E740481C1C}">
+                <a14:useLocalDpi xmlns:a14="http://schemas.microsoft.com/office/drawing/2010/main" val="0"/>
+              </a:ext>
+            </a:extLst>
+          </a:blip>
+          <a:srcRect/>
+          <a:stretch>
+            <a:fillRect/>
+          </a:stretch>
+        </p:blipFill>
+        <p:spPr bwMode="auto">
+          <a:xfrm>
+            <a:off x="8089728" y="2788305"/>
+            <a:ext cx="2503083" cy="1045037"/>
+          </a:xfrm>
+          <a:prstGeom prst="rect">
+            <a:avLst/>
+          </a:prstGeom>
+          <a:noFill/>
+          <a:extLst>
+            <a:ext uri="{909E8E84-426E-40DD-AFC4-6F175D3DCCD1}">
+              <a14:hiddenFill xmlns:a14="http://schemas.microsoft.com/office/drawing/2010/main">
+                <a:solidFill>
+                  <a:srgbClr val="FFFFFF"/>
+                </a:solidFill>
+              </a14:hiddenFill>
+            </a:ext>
+          </a:extLst>
+        </p:spPr>
+      </p:pic>
+      <p:pic>
+        <p:nvPicPr>
+          <p:cNvPr id="2054" name="Picture 6" descr="Instagram, Symbol, Logo, Foto, Kamera">
+            <a:extLst>
+              <a:ext uri="{FF2B5EF4-FFF2-40B4-BE49-F238E27FC236}">
+                <a16:creationId xmlns:a16="http://schemas.microsoft.com/office/drawing/2014/main" id="{6592BC0C-EC6E-4385-B223-BBA92F91369E}"/>
+              </a:ext>
+            </a:extLst>
+          </p:cNvPr>
+          <p:cNvPicPr>
+            <a:picLocks noChangeAspect="1" noChangeArrowheads="1"/>
+          </p:cNvPicPr>
+          <p:nvPr/>
+        </p:nvPicPr>
+        <p:blipFill>
+          <a:blip r:embed="rId5">
+            <a:extLst>
+              <a:ext uri="{28A0092B-C50C-407E-A947-70E740481C1C}">
+                <a14:useLocalDpi xmlns:a14="http://schemas.microsoft.com/office/drawing/2010/main" val="0"/>
+              </a:ext>
+            </a:extLst>
+          </a:blip>
+          <a:srcRect/>
+          <a:stretch>
+            <a:fillRect/>
+          </a:stretch>
+        </p:blipFill>
+        <p:spPr bwMode="auto">
+          <a:xfrm>
+            <a:off x="8495338" y="4090795"/>
+            <a:ext cx="1691862" cy="1677880"/>
+          </a:xfrm>
+          <a:prstGeom prst="rect">
+            <a:avLst/>
+          </a:prstGeom>
+          <a:noFill/>
+          <a:extLst>
+            <a:ext uri="{909E8E84-426E-40DD-AFC4-6F175D3DCCD1}">
+              <a14:hiddenFill xmlns:a14="http://schemas.microsoft.com/office/drawing/2010/main">
+                <a:solidFill>
+                  <a:srgbClr val="FFFFFF"/>
+                </a:solidFill>
+              </a14:hiddenFill>
+            </a:ext>
+          </a:extLst>
+        </p:spPr>
+      </p:pic>
     </p:spTree>
     <p:extLst>
       <p:ext uri="{BB962C8B-B14F-4D97-AF65-F5344CB8AC3E}">
@@ -16754,6 +18040,53 @@
           </a:p>
         </p:txBody>
       </p:sp>
+      <p:pic>
+        <p:nvPicPr>
+          <p:cNvPr id="3074" name="Picture 2" descr="https://upload.wikimedia.org/wikipedia/commons/a/ab/Hashtag.JPG">
+            <a:extLst>
+              <a:ext uri="{FF2B5EF4-FFF2-40B4-BE49-F238E27FC236}">
+                <a16:creationId xmlns:a16="http://schemas.microsoft.com/office/drawing/2014/main" id="{F11B43EF-CECD-4060-9048-C1D8DED3CA59}"/>
+              </a:ext>
+            </a:extLst>
+          </p:cNvPr>
+          <p:cNvPicPr>
+            <a:picLocks noChangeAspect="1" noChangeArrowheads="1"/>
+          </p:cNvPicPr>
+          <p:nvPr/>
+        </p:nvPicPr>
+        <p:blipFill>
+          <a:blip r:embed="rId3">
+            <a:extLst>
+              <a:ext uri="{28A0092B-C50C-407E-A947-70E740481C1C}">
+                <a14:useLocalDpi xmlns:a14="http://schemas.microsoft.com/office/drawing/2010/main" val="0"/>
+              </a:ext>
+            </a:extLst>
+          </a:blip>
+          <a:srcRect/>
+          <a:stretch>
+            <a:fillRect/>
+          </a:stretch>
+        </p:blipFill>
+        <p:spPr bwMode="auto">
+          <a:xfrm>
+            <a:off x="5256119" y="4546787"/>
+            <a:ext cx="4019550" cy="1314450"/>
+          </a:xfrm>
+          <a:prstGeom prst="rect">
+            <a:avLst/>
+          </a:prstGeom>
+          <a:noFill/>
+          <a:extLst>
+            <a:ext uri="{909E8E84-426E-40DD-AFC4-6F175D3DCCD1}">
+              <a14:hiddenFill xmlns:a14="http://schemas.microsoft.com/office/drawing/2010/main">
+                <a:solidFill>
+                  <a:srgbClr val="FFFFFF"/>
+                </a:solidFill>
+              </a14:hiddenFill>
+            </a:ext>
+          </a:extLst>
+        </p:spPr>
+      </p:pic>
     </p:spTree>
     <p:extLst>
       <p:ext uri="{BB962C8B-B14F-4D97-AF65-F5344CB8AC3E}">
@@ -17172,6 +18505,100 @@
           </a:p>
         </p:txBody>
       </p:sp>
+      <p:pic>
+        <p:nvPicPr>
+          <p:cNvPr id="1026" name="Picture 2" descr="https://abs.twimg.com/icons/apple-touch-icon-192x192.png">
+            <a:extLst>
+              <a:ext uri="{FF2B5EF4-FFF2-40B4-BE49-F238E27FC236}">
+                <a16:creationId xmlns:a16="http://schemas.microsoft.com/office/drawing/2014/main" id="{6D6AD370-10BF-4B7E-B142-BD5CEC9E065B}"/>
+              </a:ext>
+            </a:extLst>
+          </p:cNvPr>
+          <p:cNvPicPr>
+            <a:picLocks noChangeAspect="1" noChangeArrowheads="1"/>
+          </p:cNvPicPr>
+          <p:nvPr/>
+        </p:nvPicPr>
+        <p:blipFill>
+          <a:blip r:embed="rId3">
+            <a:extLst>
+              <a:ext uri="{28A0092B-C50C-407E-A947-70E740481C1C}">
+                <a14:useLocalDpi xmlns:a14="http://schemas.microsoft.com/office/drawing/2010/main" val="0"/>
+              </a:ext>
+            </a:extLst>
+          </a:blip>
+          <a:srcRect/>
+          <a:stretch>
+            <a:fillRect/>
+          </a:stretch>
+        </p:blipFill>
+        <p:spPr bwMode="auto">
+          <a:xfrm>
+            <a:off x="7344983" y="1165586"/>
+            <a:ext cx="1828800" cy="1828800"/>
+          </a:xfrm>
+          <a:prstGeom prst="rect">
+            <a:avLst/>
+          </a:prstGeom>
+          <a:noFill/>
+          <a:extLst>
+            <a:ext uri="{909E8E84-426E-40DD-AFC4-6F175D3DCCD1}">
+              <a14:hiddenFill xmlns:a14="http://schemas.microsoft.com/office/drawing/2010/main">
+                <a:solidFill>
+                  <a:srgbClr val="FFFFFF"/>
+                </a:solidFill>
+              </a14:hiddenFill>
+            </a:ext>
+          </a:extLst>
+        </p:spPr>
+      </p:pic>
+      <p:pic>
+        <p:nvPicPr>
+          <p:cNvPr id="1028" name="Picture 4" descr="https://media.licdn.com/mpr/mpr/shrink_200_200/AAEAAQAAAAAAAANyAAAAJGRlZTNlZDQwLTk4YTItNDA1MS04MzBjLWJmNGQ5M2RmZGUxYw.png">
+            <a:extLst>
+              <a:ext uri="{FF2B5EF4-FFF2-40B4-BE49-F238E27FC236}">
+                <a16:creationId xmlns:a16="http://schemas.microsoft.com/office/drawing/2014/main" id="{8432A4BE-DA31-444C-8FBA-93704D22EF3C}"/>
+              </a:ext>
+            </a:extLst>
+          </p:cNvPr>
+          <p:cNvPicPr>
+            <a:picLocks noChangeAspect="1" noChangeArrowheads="1"/>
+          </p:cNvPicPr>
+          <p:nvPr/>
+        </p:nvPicPr>
+        <p:blipFill>
+          <a:blip r:embed="rId4">
+            <a:extLst>
+              <a:ext uri="{28A0092B-C50C-407E-A947-70E740481C1C}">
+                <a14:useLocalDpi xmlns:a14="http://schemas.microsoft.com/office/drawing/2010/main" val="0"/>
+              </a:ext>
+            </a:extLst>
+          </a:blip>
+          <a:srcRect/>
+          <a:stretch>
+            <a:fillRect/>
+          </a:stretch>
+        </p:blipFill>
+        <p:spPr bwMode="auto">
+          <a:xfrm>
+            <a:off x="7636744" y="3578146"/>
+            <a:ext cx="1245278" cy="1245278"/>
+          </a:xfrm>
+          <a:prstGeom prst="rect">
+            <a:avLst/>
+          </a:prstGeom>
+          <a:noFill/>
+          <a:extLst>
+            <a:ext uri="{909E8E84-426E-40DD-AFC4-6F175D3DCCD1}">
+              <a14:hiddenFill xmlns:a14="http://schemas.microsoft.com/office/drawing/2010/main">
+                <a:solidFill>
+                  <a:srgbClr val="FFFFFF"/>
+                </a:solidFill>
+              </a14:hiddenFill>
+            </a:ext>
+          </a:extLst>
+        </p:spPr>
+      </p:pic>
     </p:spTree>
     <p:extLst>
       <p:ext uri="{BB962C8B-B14F-4D97-AF65-F5344CB8AC3E}">

</xml_diff>